<commit_message>
cfast tg: reverse sign of net radiation term, add info on qin and qout to radiation section
</commit_message>
<xml_diff>
--- a/Docs/Tech_Ref/FIGURES/radiationwall.pptx
+++ b/Docs/Tech_Ref/FIGURES/radiationwall.pptx
@@ -238,7 +238,7 @@
           <a:p>
             <a:fld id="{DB1A0588-BD2B-4491-BED8-3F7A36165C09}" type="datetimeFigureOut">
               <a:rPr lang="en-US" smtClean="0"/>
-              <a:t>8/8/2015</a:t>
+              <a:t>9/18/2015</a:t>
             </a:fld>
             <a:endParaRPr lang="en-US"/>
           </a:p>
@@ -408,7 +408,7 @@
           <a:p>
             <a:fld id="{DB1A0588-BD2B-4491-BED8-3F7A36165C09}" type="datetimeFigureOut">
               <a:rPr lang="en-US" smtClean="0"/>
-              <a:t>8/8/2015</a:t>
+              <a:t>9/18/2015</a:t>
             </a:fld>
             <a:endParaRPr lang="en-US"/>
           </a:p>
@@ -588,7 +588,7 @@
           <a:p>
             <a:fld id="{DB1A0588-BD2B-4491-BED8-3F7A36165C09}" type="datetimeFigureOut">
               <a:rPr lang="en-US" smtClean="0"/>
-              <a:t>8/8/2015</a:t>
+              <a:t>9/18/2015</a:t>
             </a:fld>
             <a:endParaRPr lang="en-US"/>
           </a:p>
@@ -758,7 +758,7 @@
           <a:p>
             <a:fld id="{DB1A0588-BD2B-4491-BED8-3F7A36165C09}" type="datetimeFigureOut">
               <a:rPr lang="en-US" smtClean="0"/>
-              <a:t>8/8/2015</a:t>
+              <a:t>9/18/2015</a:t>
             </a:fld>
             <a:endParaRPr lang="en-US"/>
           </a:p>
@@ -1004,7 +1004,7 @@
           <a:p>
             <a:fld id="{DB1A0588-BD2B-4491-BED8-3F7A36165C09}" type="datetimeFigureOut">
               <a:rPr lang="en-US" smtClean="0"/>
-              <a:t>8/8/2015</a:t>
+              <a:t>9/18/2015</a:t>
             </a:fld>
             <a:endParaRPr lang="en-US"/>
           </a:p>
@@ -1236,7 +1236,7 @@
           <a:p>
             <a:fld id="{DB1A0588-BD2B-4491-BED8-3F7A36165C09}" type="datetimeFigureOut">
               <a:rPr lang="en-US" smtClean="0"/>
-              <a:t>8/8/2015</a:t>
+              <a:t>9/18/2015</a:t>
             </a:fld>
             <a:endParaRPr lang="en-US"/>
           </a:p>
@@ -1603,7 +1603,7 @@
           <a:p>
             <a:fld id="{DB1A0588-BD2B-4491-BED8-3F7A36165C09}" type="datetimeFigureOut">
               <a:rPr lang="en-US" smtClean="0"/>
-              <a:t>8/8/2015</a:t>
+              <a:t>9/18/2015</a:t>
             </a:fld>
             <a:endParaRPr lang="en-US"/>
           </a:p>
@@ -1721,7 +1721,7 @@
           <a:p>
             <a:fld id="{DB1A0588-BD2B-4491-BED8-3F7A36165C09}" type="datetimeFigureOut">
               <a:rPr lang="en-US" smtClean="0"/>
-              <a:t>8/8/2015</a:t>
+              <a:t>9/18/2015</a:t>
             </a:fld>
             <a:endParaRPr lang="en-US"/>
           </a:p>
@@ -1816,7 +1816,7 @@
           <a:p>
             <a:fld id="{DB1A0588-BD2B-4491-BED8-3F7A36165C09}" type="datetimeFigureOut">
               <a:rPr lang="en-US" smtClean="0"/>
-              <a:t>8/8/2015</a:t>
+              <a:t>9/18/2015</a:t>
             </a:fld>
             <a:endParaRPr lang="en-US"/>
           </a:p>
@@ -2093,7 +2093,7 @@
           <a:p>
             <a:fld id="{DB1A0588-BD2B-4491-BED8-3F7A36165C09}" type="datetimeFigureOut">
               <a:rPr lang="en-US" smtClean="0"/>
-              <a:t>8/8/2015</a:t>
+              <a:t>9/18/2015</a:t>
             </a:fld>
             <a:endParaRPr lang="en-US"/>
           </a:p>
@@ -2346,7 +2346,7 @@
           <a:p>
             <a:fld id="{DB1A0588-BD2B-4491-BED8-3F7A36165C09}" type="datetimeFigureOut">
               <a:rPr lang="en-US" smtClean="0"/>
-              <a:t>8/8/2015</a:t>
+              <a:t>9/18/2015</a:t>
             </a:fld>
             <a:endParaRPr lang="en-US"/>
           </a:p>
@@ -2559,7 +2559,7 @@
           <a:p>
             <a:fld id="{DB1A0588-BD2B-4491-BED8-3F7A36165C09}" type="datetimeFigureOut">
               <a:rPr lang="en-US" smtClean="0"/>
-              <a:t>8/8/2015</a:t>
+              <a:t>9/18/2015</a:t>
             </a:fld>
             <a:endParaRPr lang="en-US"/>
           </a:p>
@@ -3069,6 +3069,7 @@
           <a:p>
             <a:r>
               <a:rPr lang="en-US" sz="2000" dirty="0">
+                <a:latin typeface="Times New Roman" panose="02020603050405020304" pitchFamily="18" charset="0"/>
                 <a:cs typeface="Times New Roman" panose="02020603050405020304" pitchFamily="18" charset="0"/>
               </a:rPr>
               <a:t>Outgoing Radiation</a:t>
@@ -3076,16 +3077,154 @@
           </a:p>
         </p:txBody>
       </p:sp>
-      <p:sp>
-        <p:nvSpPr>
-          <p:cNvPr id="16" name="TextBox 15"/>
+      <mc:AlternateContent xmlns:mc="http://schemas.openxmlformats.org/markup-compatibility/2006" xmlns:a14="http://schemas.microsoft.com/office/drawing/2010/main">
+        <mc:Choice Requires="a14">
+          <p:sp>
+            <p:nvSpPr>
+              <p:cNvPr id="16" name="TextBox 15"/>
+              <p:cNvSpPr txBox="1"/>
+              <p:nvPr/>
+            </p:nvSpPr>
+            <p:spPr>
+              <a:xfrm>
+                <a:off x="7246386" y="2014002"/>
+                <a:ext cx="3009224" cy="668581"/>
+              </a:xfrm>
+              <a:prstGeom prst="rect">
+                <a:avLst/>
+              </a:prstGeom>
+              <a:noFill/>
+            </p:spPr>
+            <p:txBody>
+              <a:bodyPr wrap="square" rtlCol="0">
+                <a:spAutoFit/>
+              </a:bodyPr>
+              <a:lstStyle/>
+              <a:p>
+                <a:r>
+                  <a:rPr lang="en-US" dirty="0" smtClean="0">
+                    <a:latin typeface="Times New Roman" panose="02020603050405020304" pitchFamily="18" charset="0"/>
+                    <a:cs typeface="Times New Roman" panose="02020603050405020304" pitchFamily="18" charset="0"/>
+                  </a:rPr>
+                  <a:t>Radiant energy,</a:t>
+                </a:r>
+                <a:r>
+                  <a:rPr lang="en-US" dirty="0" smtClean="0"/>
+                  <a:t> </a:t>
+                </a:r>
+                <a14:m>
+                  <m:oMath xmlns:m="http://schemas.openxmlformats.org/officeDocument/2006/math">
+                    <m:sSubSup>
+                      <m:sSubSupPr>
+                        <m:ctrlPr>
+                          <a:rPr lang="en-US" i="1">
+                            <a:latin typeface="Cambria Math"/>
+                          </a:rPr>
+                        </m:ctrlPr>
+                      </m:sSubSupPr>
+                      <m:e>
+                        <m:acc>
+                          <m:accPr>
+                            <m:chr m:val="̇"/>
+                            <m:ctrlPr>
+                              <a:rPr lang="en-US" i="1">
+                                <a:latin typeface="Cambria Math"/>
+                              </a:rPr>
+                            </m:ctrlPr>
+                          </m:accPr>
+                          <m:e>
+                            <m:r>
+                              <a:rPr lang="en-US" i="1">
+                                <a:latin typeface="Cambria Math"/>
+                              </a:rPr>
+                              <m:t>𝑞</m:t>
+                            </m:r>
+                          </m:e>
+                        </m:acc>
+                      </m:e>
+                      <m:sub>
+                        <m:r>
+                          <a:rPr lang="en-US" i="1">
+                            <a:latin typeface="Cambria Math"/>
+                          </a:rPr>
+                          <m:t>𝑘</m:t>
+                        </m:r>
+                      </m:sub>
+                      <m:sup>
+                        <m:r>
+                          <a:rPr lang="en-US" i="1">
+                            <a:latin typeface="Cambria Math"/>
+                          </a:rPr>
+                          <m:t>𝑖𝑛</m:t>
+                        </m:r>
+                      </m:sup>
+                    </m:sSubSup>
+                  </m:oMath>
+                </a14:m>
+                <a:r>
+                  <a:rPr lang="en-US" dirty="0" smtClean="0">
+                    <a:latin typeface="Times New Roman" panose="02020603050405020304" pitchFamily="18" charset="0"/>
+                    <a:cs typeface="Times New Roman" panose="02020603050405020304" pitchFamily="18" charset="0"/>
+                  </a:rPr>
+                  <a:t> , from all sources incident at surface k</a:t>
+                </a:r>
+                <a:endParaRPr lang="en-US" dirty="0">
+                  <a:latin typeface="Times New Roman" panose="02020603050405020304" pitchFamily="18" charset="0"/>
+                  <a:cs typeface="Times New Roman" panose="02020603050405020304" pitchFamily="18" charset="0"/>
+                </a:endParaRPr>
+              </a:p>
+            </p:txBody>
+          </p:sp>
+        </mc:Choice>
+        <mc:Fallback xmlns="">
+          <p:sp>
+            <p:nvSpPr>
+              <p:cNvPr id="16" name="TextBox 15"/>
+              <p:cNvSpPr txBox="1">
+                <a:spLocks noRot="1" noChangeAspect="1" noMove="1" noResize="1" noEditPoints="1" noAdjustHandles="1" noChangeArrowheads="1" noChangeShapeType="1" noTextEdit="1"/>
+              </p:cNvSpPr>
+              <p:nvPr/>
+            </p:nvSpPr>
+            <p:spPr>
+              <a:xfrm>
+                <a:off x="7246386" y="2014002"/>
+                <a:ext cx="3009224" cy="668581"/>
+              </a:xfrm>
+              <a:prstGeom prst="rect">
+                <a:avLst/>
+              </a:prstGeom>
+              <a:blipFill rotWithShape="1">
+                <a:blip r:embed="rId3"/>
+                <a:stretch>
+                  <a:fillRect l="-1826" t="-1818" b="-13636"/>
+                </a:stretch>
+              </a:blipFill>
+            </p:spPr>
+            <p:txBody>
+              <a:bodyPr/>
+              <a:lstStyle/>
+              <a:p>
+                <a:r>
+                  <a:rPr lang="en-US">
+                    <a:noFill/>
+                  </a:rPr>
+                  <a:t> </a:t>
+                </a:r>
+              </a:p>
+            </p:txBody>
+          </p:sp>
+        </mc:Fallback>
+      </mc:AlternateContent>
+      <p:sp>
+        <p:nvSpPr>
+          <p:cNvPr id="17" name="TextBox 16"/>
           <p:cNvSpPr txBox="1"/>
           <p:nvPr/>
         </p:nvSpPr>
         <p:spPr>
           <a:xfrm>
-            <a:off x="7246386" y="1965018"/>
-            <a:ext cx="3094891" cy="923330"/>
+            <a:off x="8415488" y="3107532"/>
+            <a:ext cx="2557311" cy="646331"/>
           </a:xfrm>
           <a:prstGeom prst="rect">
             <a:avLst/>
@@ -3100,84 +3239,156 @@
           <a:p>
             <a:r>
               <a:rPr lang="en-US" dirty="0" smtClean="0">
+                <a:latin typeface="Times New Roman" panose="02020603050405020304" pitchFamily="18" charset="0"/>
                 <a:cs typeface="Times New Roman" panose="02020603050405020304" pitchFamily="18" charset="0"/>
               </a:rPr>
-              <a:t>Incoming radiation from other surface, fires and emitting, absorbing gas  layers</a:t>
+              <a:t>Radiant energy required for steady state</a:t>
             </a:r>
             <a:endParaRPr lang="en-US" dirty="0">
+              <a:latin typeface="Times New Roman" panose="02020603050405020304" pitchFamily="18" charset="0"/>
               <a:cs typeface="Times New Roman" panose="02020603050405020304" pitchFamily="18" charset="0"/>
             </a:endParaRPr>
           </a:p>
         </p:txBody>
       </p:sp>
-      <p:sp>
-        <p:nvSpPr>
-          <p:cNvPr id="17" name="TextBox 16"/>
-          <p:cNvSpPr txBox="1"/>
-          <p:nvPr/>
-        </p:nvSpPr>
-        <p:spPr>
-          <a:xfrm>
-            <a:off x="8317521" y="3099368"/>
-            <a:ext cx="2708030" cy="646331"/>
-          </a:xfrm>
-          <a:prstGeom prst="rect">
-            <a:avLst/>
-          </a:prstGeom>
-          <a:noFill/>
-        </p:spPr>
-        <p:txBody>
-          <a:bodyPr wrap="square" rtlCol="0">
-            <a:spAutoFit/>
-          </a:bodyPr>
-          <a:lstStyle/>
-          <a:p>
-            <a:r>
-              <a:rPr lang="en-US" dirty="0" smtClean="0">
-                <a:cs typeface="Times New Roman" panose="02020603050405020304" pitchFamily="18" charset="0"/>
-              </a:rPr>
-              <a:t>Energy added to maintain a constant temperature </a:t>
-            </a:r>
-            <a:endParaRPr lang="en-US" dirty="0">
-              <a:cs typeface="Times New Roman" panose="02020603050405020304" pitchFamily="18" charset="0"/>
-            </a:endParaRPr>
-          </a:p>
-        </p:txBody>
-      </p:sp>
-      <p:sp>
-        <p:nvSpPr>
-          <p:cNvPr id="18" name="TextBox 17"/>
-          <p:cNvSpPr txBox="1"/>
-          <p:nvPr/>
-        </p:nvSpPr>
-        <p:spPr>
-          <a:xfrm>
-            <a:off x="4261357" y="1965018"/>
-            <a:ext cx="1746739" cy="646331"/>
-          </a:xfrm>
-          <a:prstGeom prst="rect">
-            <a:avLst/>
-          </a:prstGeom>
-          <a:noFill/>
-        </p:spPr>
-        <p:txBody>
-          <a:bodyPr wrap="square" rtlCol="0">
-            <a:spAutoFit/>
-          </a:bodyPr>
-          <a:lstStyle/>
-          <a:p>
-            <a:r>
-              <a:rPr lang="en-US" dirty="0" smtClean="0">
-                <a:cs typeface="Times New Roman" panose="02020603050405020304" pitchFamily="18" charset="0"/>
-              </a:rPr>
-              <a:t>Reflected radiant energy</a:t>
-            </a:r>
-            <a:endParaRPr lang="en-US" dirty="0">
-              <a:cs typeface="Times New Roman" panose="02020603050405020304" pitchFamily="18" charset="0"/>
-            </a:endParaRPr>
-          </a:p>
-        </p:txBody>
-      </p:sp>
+      <mc:AlternateContent xmlns:mc="http://schemas.openxmlformats.org/markup-compatibility/2006" xmlns:a14="http://schemas.microsoft.com/office/drawing/2010/main">
+        <mc:Choice Requires="a14">
+          <p:sp>
+            <p:nvSpPr>
+              <p:cNvPr id="18" name="TextBox 17"/>
+              <p:cNvSpPr txBox="1"/>
+              <p:nvPr/>
+            </p:nvSpPr>
+            <p:spPr>
+              <a:xfrm>
+                <a:off x="4261357" y="1965018"/>
+                <a:ext cx="2139443" cy="945580"/>
+              </a:xfrm>
+              <a:prstGeom prst="rect">
+                <a:avLst/>
+              </a:prstGeom>
+              <a:noFill/>
+            </p:spPr>
+            <p:txBody>
+              <a:bodyPr wrap="square" rtlCol="0">
+                <a:spAutoFit/>
+              </a:bodyPr>
+              <a:lstStyle/>
+              <a:p>
+                <a:r>
+                  <a:rPr lang="en-US" dirty="0" smtClean="0">
+                    <a:latin typeface="Times New Roman" panose="02020603050405020304" pitchFamily="18" charset="0"/>
+                    <a:cs typeface="Times New Roman" panose="02020603050405020304" pitchFamily="18" charset="0"/>
+                  </a:rPr>
+                  <a:t>Radiant energy,</a:t>
+                </a:r>
+                <a:r>
+                  <a:rPr lang="en-US" dirty="0"/>
+                  <a:t> </a:t>
+                </a:r>
+                <a14:m>
+                  <m:oMath xmlns:m="http://schemas.openxmlformats.org/officeDocument/2006/math">
+                    <m:sSubSup>
+                      <m:sSubSupPr>
+                        <m:ctrlPr>
+                          <a:rPr lang="en-US" i="1">
+                            <a:latin typeface="Cambria Math"/>
+                          </a:rPr>
+                        </m:ctrlPr>
+                      </m:sSubSupPr>
+                      <m:e>
+                        <m:acc>
+                          <m:accPr>
+                            <m:chr m:val="̇"/>
+                            <m:ctrlPr>
+                              <a:rPr lang="en-US" i="1">
+                                <a:latin typeface="Cambria Math"/>
+                              </a:rPr>
+                            </m:ctrlPr>
+                          </m:accPr>
+                          <m:e>
+                            <m:r>
+                              <a:rPr lang="en-US" i="1">
+                                <a:latin typeface="Cambria Math"/>
+                              </a:rPr>
+                              <m:t>𝑞</m:t>
+                            </m:r>
+                          </m:e>
+                        </m:acc>
+                      </m:e>
+                      <m:sub>
+                        <m:r>
+                          <a:rPr lang="en-US" i="1">
+                            <a:latin typeface="Cambria Math"/>
+                          </a:rPr>
+                          <m:t>𝑘</m:t>
+                        </m:r>
+                      </m:sub>
+                      <m:sup>
+                        <m:r>
+                          <a:rPr lang="en-US" i="1">
+                            <a:latin typeface="Cambria Math"/>
+                          </a:rPr>
+                          <m:t>𝑖𝑛</m:t>
+                        </m:r>
+                      </m:sup>
+                    </m:sSubSup>
+                  </m:oMath>
+                </a14:m>
+                <a:r>
+                  <a:rPr lang="en-US" dirty="0" smtClean="0">
+                    <a:latin typeface="Times New Roman" panose="02020603050405020304" pitchFamily="18" charset="0"/>
+                    <a:cs typeface="Times New Roman" panose="02020603050405020304" pitchFamily="18" charset="0"/>
+                  </a:rPr>
+                  <a:t>, from all sources  reflected at surface k</a:t>
+                </a:r>
+                <a:endParaRPr lang="en-US" dirty="0">
+                  <a:latin typeface="Times New Roman" panose="02020603050405020304" pitchFamily="18" charset="0"/>
+                  <a:cs typeface="Times New Roman" panose="02020603050405020304" pitchFamily="18" charset="0"/>
+                </a:endParaRPr>
+              </a:p>
+            </p:txBody>
+          </p:sp>
+        </mc:Choice>
+        <mc:Fallback xmlns="">
+          <p:sp>
+            <p:nvSpPr>
+              <p:cNvPr id="18" name="TextBox 17"/>
+              <p:cNvSpPr txBox="1">
+                <a:spLocks noRot="1" noChangeAspect="1" noMove="1" noResize="1" noEditPoints="1" noAdjustHandles="1" noChangeArrowheads="1" noChangeShapeType="1" noTextEdit="1"/>
+              </p:cNvSpPr>
+              <p:nvPr/>
+            </p:nvSpPr>
+            <p:spPr>
+              <a:xfrm>
+                <a:off x="4261357" y="1965018"/>
+                <a:ext cx="2139443" cy="945580"/>
+              </a:xfrm>
+              <a:prstGeom prst="rect">
+                <a:avLst/>
+              </a:prstGeom>
+              <a:blipFill rotWithShape="1">
+                <a:blip r:embed="rId4"/>
+                <a:stretch>
+                  <a:fillRect l="-2279" t="-1290" r="-570" b="-9677"/>
+                </a:stretch>
+              </a:blipFill>
+            </p:spPr>
+            <p:txBody>
+              <a:bodyPr/>
+              <a:lstStyle/>
+              <a:p>
+                <a:r>
+                  <a:rPr lang="en-US">
+                    <a:noFill/>
+                  </a:rPr>
+                  <a:t> </a:t>
+                </a:r>
+              </a:p>
+            </p:txBody>
+          </p:sp>
+        </mc:Fallback>
+      </mc:AlternateContent>
       <p:sp>
         <p:nvSpPr>
           <p:cNvPr id="19" name="TextBox 18"/>
@@ -3202,11 +3413,13 @@
           <a:p>
             <a:r>
               <a:rPr lang="en-US" dirty="0" smtClean="0">
+                <a:latin typeface="Times New Roman" panose="02020603050405020304" pitchFamily="18" charset="0"/>
                 <a:cs typeface="Times New Roman" panose="02020603050405020304" pitchFamily="18" charset="0"/>
               </a:rPr>
               <a:t>Grey body surface radiation</a:t>
             </a:r>
             <a:endParaRPr lang="en-US" dirty="0">
+              <a:latin typeface="Times New Roman" panose="02020603050405020304" pitchFamily="18" charset="0"/>
               <a:cs typeface="Times New Roman" panose="02020603050405020304" pitchFamily="18" charset="0"/>
             </a:endParaRPr>
           </a:p>
@@ -3236,11 +3449,13 @@
           <a:p>
             <a:r>
               <a:rPr lang="en-US" dirty="0" smtClean="0">
+                <a:latin typeface="Times New Roman" panose="02020603050405020304" pitchFamily="18" charset="0"/>
                 <a:cs typeface="Times New Roman" panose="02020603050405020304" pitchFamily="18" charset="0"/>
               </a:rPr>
               <a:t>Surface k</a:t>
             </a:r>
             <a:endParaRPr lang="en-US" dirty="0">
+              <a:latin typeface="Times New Roman" panose="02020603050405020304" pitchFamily="18" charset="0"/>
               <a:cs typeface="Times New Roman" panose="02020603050405020304" pitchFamily="18" charset="0"/>
             </a:endParaRPr>
           </a:p>
@@ -3255,7 +3470,7 @@
         <p:spPr>
           <a:xfrm>
             <a:off x="8030320" y="1367078"/>
-            <a:ext cx="2195153" cy="400110"/>
+            <a:ext cx="2225289" cy="400110"/>
           </a:xfrm>
           <a:prstGeom prst="rect">
             <a:avLst/>
@@ -3270,11 +3485,13 @@
           <a:p>
             <a:r>
               <a:rPr lang="en-US" sz="2000" dirty="0" smtClean="0">
+                <a:latin typeface="Times New Roman" panose="02020603050405020304" pitchFamily="18" charset="0"/>
                 <a:cs typeface="Times New Roman" panose="02020603050405020304" pitchFamily="18" charset="0"/>
               </a:rPr>
               <a:t>Incoming Radiation</a:t>
             </a:r>
             <a:endParaRPr lang="en-US" sz="2000" dirty="0">
+              <a:latin typeface="Times New Roman" panose="02020603050405020304" pitchFamily="18" charset="0"/>
               <a:cs typeface="Times New Roman" panose="02020603050405020304" pitchFamily="18" charset="0"/>
             </a:endParaRPr>
           </a:p>
@@ -3426,8 +3643,8 @@
           </a:fontRef>
         </p:style>
       </p:cxnSp>
-      <mc:AlternateContent xmlns:mc="http://schemas.openxmlformats.org/markup-compatibility/2006">
-        <mc:Choice xmlns:a14="http://schemas.microsoft.com/office/drawing/2010/main" Requires="a14">
+      <mc:AlternateContent xmlns:mc="http://schemas.openxmlformats.org/markup-compatibility/2006" xmlns:a14="http://schemas.microsoft.com/office/drawing/2010/main">
+        <mc:Choice Requires="a14">
           <p:sp>
             <p:nvSpPr>
               <p:cNvPr id="38" name="TextBox 37"/>
@@ -3438,7 +3655,7 @@
             </p:nvSpPr>
             <p:spPr>
               <a:xfrm>
-                <a:off x="7908738" y="2866819"/>
+                <a:off x="7934112" y="2866819"/>
                 <a:ext cx="550343" cy="548640"/>
               </a:xfrm>
               <a:prstGeom prst="rect">
@@ -3512,7 +3729,7 @@
             </p:txBody>
           </p:sp>
         </mc:Choice>
-        <mc:Fallback>
+        <mc:Fallback xmlns="">
           <p:sp>
             <p:nvSpPr>
               <p:cNvPr id="38" name="TextBox 37"/>
@@ -3523,14 +3740,14 @@
             </p:nvSpPr>
             <p:spPr>
               <a:xfrm>
-                <a:off x="7908738" y="2866819"/>
+                <a:off x="7934112" y="2866819"/>
                 <a:ext cx="550343" cy="548640"/>
               </a:xfrm>
               <a:prstGeom prst="rect">
                 <a:avLst/>
               </a:prstGeom>
               <a:blipFill rotWithShape="1">
-                <a:blip r:embed="rId3"/>
+                <a:blip r:embed="rId5"/>
                 <a:stretch>
                   <a:fillRect/>
                 </a:stretch>
@@ -3551,8 +3768,8 @@
           </p:sp>
         </mc:Fallback>
       </mc:AlternateContent>
-      <mc:AlternateContent xmlns:mc="http://schemas.openxmlformats.org/markup-compatibility/2006">
-        <mc:Choice xmlns:a14="http://schemas.microsoft.com/office/drawing/2010/main" Requires="a14">
+      <mc:AlternateContent xmlns:mc="http://schemas.openxmlformats.org/markup-compatibility/2006" xmlns:a14="http://schemas.microsoft.com/office/drawing/2010/main">
+        <mc:Choice Requires="a14">
           <p:sp>
             <p:nvSpPr>
               <p:cNvPr id="39" name="TextBox 38"/>
@@ -3675,7 +3892,7 @@
             </p:txBody>
           </p:sp>
         </mc:Choice>
-        <mc:Fallback>
+        <mc:Fallback xmlns="">
           <p:sp>
             <p:nvSpPr>
               <p:cNvPr id="39" name="TextBox 38"/>
@@ -3693,7 +3910,7 @@
                 <a:avLst/>
               </a:prstGeom>
               <a:blipFill rotWithShape="1">
-                <a:blip r:embed="rId4"/>
+                <a:blip r:embed="rId6"/>
                 <a:stretch>
                   <a:fillRect/>
                 </a:stretch>
@@ -3714,8 +3931,8 @@
           </p:sp>
         </mc:Fallback>
       </mc:AlternateContent>
-      <mc:AlternateContent xmlns:mc="http://schemas.openxmlformats.org/markup-compatibility/2006">
-        <mc:Choice xmlns:a14="http://schemas.microsoft.com/office/drawing/2010/main" Requires="a14">
+      <mc:AlternateContent xmlns:mc="http://schemas.openxmlformats.org/markup-compatibility/2006" xmlns:a14="http://schemas.microsoft.com/office/drawing/2010/main">
+        <mc:Choice Requires="a14">
           <p:sp>
             <p:nvSpPr>
               <p:cNvPr id="40" name="TextBox 39"/>
@@ -3849,7 +4066,7 @@
             </p:txBody>
           </p:sp>
         </mc:Choice>
-        <mc:Fallback>
+        <mc:Fallback xmlns="">
           <p:sp>
             <p:nvSpPr>
               <p:cNvPr id="40" name="TextBox 39"/>
@@ -3867,7 +4084,7 @@
                 <a:avLst/>
               </a:prstGeom>
               <a:blipFill rotWithShape="1">
-                <a:blip r:embed="rId5"/>
+                <a:blip r:embed="rId7"/>
                 <a:stretch>
                   <a:fillRect/>
                 </a:stretch>
@@ -4023,25 +4240,25 @@
           <p:nvPr>
             <p:extLst>
               <p:ext uri="{D42A27DB-BD31-4B8C-83A1-F6EECF244321}">
-                <p14:modId xmlns:p14="http://schemas.microsoft.com/office/powerpoint/2010/main" val="2750840188"/>
+                <p14:modId xmlns:p14="http://schemas.microsoft.com/office/powerpoint/2010/main" val="3228250401"/>
               </p:ext>
             </p:extLst>
           </p:nvPr>
         </p:nvGraphicFramePr>
         <p:xfrm>
-          <a:off x="8462899" y="3661477"/>
-          <a:ext cx="885372" cy="457200"/>
+          <a:off x="8440738" y="3660775"/>
+          <a:ext cx="931862" cy="457200"/>
         </p:xfrm>
         <a:graphic>
           <a:graphicData uri="http://schemas.openxmlformats.org/presentationml/2006/ole">
             <mc:AlternateContent xmlns:mc="http://schemas.openxmlformats.org/markup-compatibility/2006">
               <mc:Choice xmlns:v="urn:schemas-microsoft-com:vml" Requires="v">
-                <p:oleObj spid="_x0000_s1032" name="Equation" r:id="rId6" imgW="482391" imgH="253890" progId="Equation.3">
+                <p:oleObj spid="_x0000_s1038" name="Equation" r:id="rId8" imgW="507960" imgH="253800" progId="Equation.3">
                   <p:embed/>
                 </p:oleObj>
               </mc:Choice>
               <mc:Fallback>
-                <p:oleObj name="Equation" r:id="rId6" imgW="482391" imgH="253890" progId="Equation.3">
+                <p:oleObj name="Equation" r:id="rId8" imgW="507960" imgH="253800" progId="Equation.3">
                   <p:embed/>
                   <p:pic>
                     <p:nvPicPr>
@@ -4052,13 +4269,7 @@
                       <p:nvPr/>
                     </p:nvPicPr>
                     <p:blipFill>
-                      <a:blip r:embed="rId7">
-                        <a:extLst>
-                          <a:ext uri="{28A0092B-C50C-407E-A947-70E740481C1C}">
-                            <a14:useLocalDpi xmlns:a14="http://schemas.microsoft.com/office/drawing/2010/main" val="0"/>
-                          </a:ext>
-                        </a:extLst>
-                      </a:blip>
+                      <a:blip r:embed="rId9"/>
                       <a:srcRect/>
                       <a:stretch>
                         <a:fillRect/>
@@ -4066,8 +4277,8 @@
                     </p:blipFill>
                     <p:spPr bwMode="auto">
                       <a:xfrm>
-                        <a:off x="8462899" y="3661477"/>
-                        <a:ext cx="885372" cy="457200"/>
+                        <a:off x="8440738" y="3660775"/>
+                        <a:ext cx="931862" cy="457200"/>
                       </a:xfrm>
                       <a:prstGeom prst="rect">
                         <a:avLst/>

</xml_diff>